<commit_message>
Updated and improved examples to version 20.4.
</commit_message>
<xml_diff>
--- a/Examples/templates/AddSlides.pptx
+++ b/Examples/templates/AddSlides.pptx
@@ -1,6 +1,7 @@
 
 <file path=ppt/presentation.xml><?xml version="1.0" encoding="utf-8"?>
-<p:presentation xmlns:a="http://schemas.openxmlformats.org/drawingml/2006/main" xmlns:r="http://schemas.openxmlformats.org/officeDocument/2006/relationships" xmlns:p="http://schemas.openxmlformats.org/presentationml/2006/main" saveSubsetFonts="1">
+<!--Generated by Aspose.Slides for .NET 20.3-->
+<p:presentation xmlns:r="http://schemas.openxmlformats.org/officeDocument/2006/relationships" xmlns:a="http://schemas.openxmlformats.org/drawingml/2006/main" xmlns:p="http://schemas.openxmlformats.org/presentationml/2006/main" saveSubsetFonts="1">
   <p:sldMasterIdLst>
     <p:sldMasterId id="2147483648" r:id="rId1"/>
   </p:sldMasterIdLst>
@@ -118,41 +119,11 @@
       </a:defRPr>
     </a:lvl9pPr>
   </p:defaultTextStyle>
-  <p:extLst>
-    <p:ext uri="{521415D9-36F7-43E2-AB2F-B90AF26B5E84}">
-      <p14:sectionLst xmlns:p14="http://schemas.microsoft.com/office/powerpoint/2010/main">
-        <p14:section name="First Section" id="{E1BB10DC-7DFB-408E-B2C1-4E2F61A74C57}">
-          <p14:sldIdLst>
-            <p14:sldId id="256"/>
-          </p14:sldIdLst>
-        </p14:section>
-        <p14:section name="Second Section" id="{860AAB71-4074-46DD-98E3-7BD7ACBA71C7}">
-          <p14:sldIdLst>
-            <p14:sldId id="258"/>
-            <p14:sldId id="260"/>
-          </p14:sldIdLst>
-        </p14:section>
-        <p14:section name="Third Section" id="{265CD7D1-1122-4D10-9E29-681950069685}">
-          <p14:sldIdLst>
-            <p14:sldId id="262"/>
-            <p14:sldId id="264"/>
-            <p14:sldId id="266"/>
-            <p14:sldId id="268"/>
-            <p14:sldId id="270"/>
-            <p14:sldId id="272"/>
-            <p14:sldId id="274"/>
-            <p14:sldId id="276"/>
-            <p14:sldId id="278"/>
-          </p14:sldIdLst>
-        </p14:section>
-      </p14:sectionLst>
-    </p:ext>
-  </p:extLst>
 </p:presentation>
 </file>
 
 <file path=ppt/slideLayouts/slideLayout1.xml><?xml version="1.0" encoding="utf-8"?>
-<p:sldLayout xmlns:a="http://schemas.openxmlformats.org/drawingml/2006/main" xmlns:r="http://schemas.openxmlformats.org/officeDocument/2006/relationships" xmlns:p="http://schemas.openxmlformats.org/presentationml/2006/main" type="title" preserve="1">
+<p:sldLayout xmlns:a="http://schemas.openxmlformats.org/drawingml/2006/main" xmlns:r="http://schemas.openxmlformats.org/officeDocument/2006/relationships" xmlns:m="http://schemas.openxmlformats.org/officeDocument/2006/math" xmlns:w="http://schemas.openxmlformats.org/wordprocessingml/2006/main" xmlns:xml="http://www.w3.org/XML/1998/namespace" xmlns:wp="http://schemas.openxmlformats.org/drawingml/2006/wordprocessingDrawing" xmlns:a14="http://schemas.microsoft.com/office/drawing/2010/main" xmlns:p14="http://schemas.microsoft.com/office/powerpoint/2010/main" xmlns:p15="http://schemas.microsoft.com/office/powerpoint/2012/main" xmlns:p159="http://schemas.microsoft.com/office/powerpoint/2015/09/main" xmlns:p="http://schemas.openxmlformats.org/presentationml/2006/main" type="title" preserve="1">
   <p:cSld name="Title Slide">
     <p:spTree>
       <p:nvGrpSpPr>
@@ -164,8 +135,6 @@
         <a:xfrm>
           <a:off x="0" y="0"/>
           <a:ext cx="0" cy="0"/>
-          <a:chOff x="0" y="0"/>
-          <a:chExt cx="0" cy="0"/>
         </a:xfrm>
       </p:grpSpPr>
       <p:sp>
@@ -320,9 +289,9 @@
           <a:bodyPr/>
           <a:lstStyle/>
           <a:p>
-            <a:fld id="{4C124966-30DB-49EF-8740-571164F39E6C}" type="datetimeFigureOut">
-              <a:rPr lang="en-US" smtClean="0"/>
-              <a:t>1/7/2018</a:t>
+            <a:fld id="{FB20237E-FFA6-4DCB-A4A9-5310BBC8FB04}" type="datetimeFigureOut">
+              <a:rPr lang="en-US" smtClean="0"/>
+              <a:t>11/7/2009</a:t>
             </a:fld>
             <a:endParaRPr lang="en-US"/>
           </a:p>
@@ -376,11 +345,12 @@
     <a:masterClrMapping/>
   </p:clrMapOvr>
   <p:transition/>
+  <p:timing/>
 </p:sldLayout>
 </file>
 
 <file path=ppt/slideLayouts/slideLayout10.xml><?xml version="1.0" encoding="utf-8"?>
-<p:sldLayout xmlns:a="http://schemas.openxmlformats.org/drawingml/2006/main" xmlns:r="http://schemas.openxmlformats.org/officeDocument/2006/relationships" xmlns:p="http://schemas.openxmlformats.org/presentationml/2006/main" type="vertTx" preserve="1">
+<p:sldLayout xmlns:a="http://schemas.openxmlformats.org/drawingml/2006/main" xmlns:r="http://schemas.openxmlformats.org/officeDocument/2006/relationships" xmlns:m="http://schemas.openxmlformats.org/officeDocument/2006/math" xmlns:w="http://schemas.openxmlformats.org/wordprocessingml/2006/main" xmlns:xml="http://www.w3.org/XML/1998/namespace" xmlns:wp="http://schemas.openxmlformats.org/drawingml/2006/wordprocessingDrawing" xmlns:a14="http://schemas.microsoft.com/office/drawing/2010/main" xmlns:p14="http://schemas.microsoft.com/office/powerpoint/2010/main" xmlns:p15="http://schemas.microsoft.com/office/powerpoint/2012/main" xmlns:p159="http://schemas.microsoft.com/office/powerpoint/2015/09/main" xmlns:p="http://schemas.openxmlformats.org/presentationml/2006/main" type="vertTx" preserve="1">
   <p:cSld name="Title and Vertical Text">
     <p:spTree>
       <p:nvGrpSpPr>
@@ -392,8 +362,6 @@
         <a:xfrm>
           <a:off x="0" y="0"/>
           <a:ext cx="0" cy="0"/>
-          <a:chOff x="0" y="0"/>
-          <a:chExt cx="0" cy="0"/>
         </a:xfrm>
       </p:grpSpPr>
       <p:sp>
@@ -485,9 +453,9 @@
           <a:bodyPr/>
           <a:lstStyle/>
           <a:p>
-            <a:fld id="{FF175B64-3D27-4EB3-8DE3-958CCAF9C8FD}" type="datetimeFigureOut">
-              <a:rPr lang="en-US" smtClean="0"/>
-              <a:t>1/7/2018</a:t>
+            <a:fld id="{0BF890AE-D7ED-493E-83FC-7E0A2FE76F4C}" type="datetimeFigureOut">
+              <a:rPr lang="en-US" smtClean="0"/>
+              <a:t>11/7/2009</a:t>
             </a:fld>
             <a:endParaRPr lang="en-US"/>
           </a:p>
@@ -541,11 +509,12 @@
     <a:masterClrMapping/>
   </p:clrMapOvr>
   <p:transition/>
+  <p:timing/>
 </p:sldLayout>
 </file>
 
 <file path=ppt/slideLayouts/slideLayout11.xml><?xml version="1.0" encoding="utf-8"?>
-<p:sldLayout xmlns:a="http://schemas.openxmlformats.org/drawingml/2006/main" xmlns:r="http://schemas.openxmlformats.org/officeDocument/2006/relationships" xmlns:p="http://schemas.openxmlformats.org/presentationml/2006/main" type="vertTitleAndTx" preserve="1">
+<p:sldLayout xmlns:a="http://schemas.openxmlformats.org/drawingml/2006/main" xmlns:r="http://schemas.openxmlformats.org/officeDocument/2006/relationships" xmlns:m="http://schemas.openxmlformats.org/officeDocument/2006/math" xmlns:w="http://schemas.openxmlformats.org/wordprocessingml/2006/main" xmlns:xml="http://www.w3.org/XML/1998/namespace" xmlns:wp="http://schemas.openxmlformats.org/drawingml/2006/wordprocessingDrawing" xmlns:a14="http://schemas.microsoft.com/office/drawing/2010/main" xmlns:p14="http://schemas.microsoft.com/office/powerpoint/2010/main" xmlns:p15="http://schemas.microsoft.com/office/powerpoint/2012/main" xmlns:p159="http://schemas.microsoft.com/office/powerpoint/2015/09/main" xmlns:p="http://schemas.openxmlformats.org/presentationml/2006/main" type="vertTitleAndTx" preserve="1">
   <p:cSld name="Vertical Title and Text">
     <p:spTree>
       <p:nvGrpSpPr>
@@ -557,8 +526,6 @@
         <a:xfrm>
           <a:off x="0" y="0"/>
           <a:ext cx="0" cy="0"/>
-          <a:chOff x="0" y="0"/>
-          <a:chExt cx="0" cy="0"/>
         </a:xfrm>
       </p:grpSpPr>
       <p:sp>
@@ -650,9 +617,9 @@
           <a:bodyPr/>
           <a:lstStyle/>
           <a:p>
-            <a:fld id="{49019F3C-61E0-4125-8A4C-1D928C1046BD}" type="datetimeFigureOut">
-              <a:rPr lang="en-US" smtClean="0"/>
-              <a:t>1/7/2018</a:t>
+            <a:fld id="{72DC28BF-3F60-4004-AD99-8444A2EDD89D}" type="datetimeFigureOut">
+              <a:rPr lang="en-US" smtClean="0"/>
+              <a:t>11/7/2009</a:t>
             </a:fld>
             <a:endParaRPr lang="en-US"/>
           </a:p>
@@ -706,11 +673,12 @@
     <a:masterClrMapping/>
   </p:clrMapOvr>
   <p:transition/>
+  <p:timing/>
 </p:sldLayout>
 </file>
 
 <file path=ppt/slideLayouts/slideLayout2.xml><?xml version="1.0" encoding="utf-8"?>
-<p:sldLayout xmlns:a="http://schemas.openxmlformats.org/drawingml/2006/main" xmlns:r="http://schemas.openxmlformats.org/officeDocument/2006/relationships" xmlns:p="http://schemas.openxmlformats.org/presentationml/2006/main" type="obj" preserve="1">
+<p:sldLayout xmlns:a="http://schemas.openxmlformats.org/drawingml/2006/main" xmlns:r="http://schemas.openxmlformats.org/officeDocument/2006/relationships" xmlns:m="http://schemas.openxmlformats.org/officeDocument/2006/math" xmlns:w="http://schemas.openxmlformats.org/wordprocessingml/2006/main" xmlns:xml="http://www.w3.org/XML/1998/namespace" xmlns:wp="http://schemas.openxmlformats.org/drawingml/2006/wordprocessingDrawing" xmlns:a14="http://schemas.microsoft.com/office/drawing/2010/main" xmlns:p14="http://schemas.microsoft.com/office/powerpoint/2010/main" xmlns:p15="http://schemas.microsoft.com/office/powerpoint/2012/main" xmlns:p159="http://schemas.microsoft.com/office/powerpoint/2015/09/main" xmlns:p="http://schemas.openxmlformats.org/presentationml/2006/main" type="obj" preserve="1">
   <p:cSld name="Title and Content">
     <p:spTree>
       <p:nvGrpSpPr>
@@ -722,8 +690,6 @@
         <a:xfrm>
           <a:off x="0" y="0"/>
           <a:ext cx="0" cy="0"/>
-          <a:chOff x="0" y="0"/>
-          <a:chExt cx="0" cy="0"/>
         </a:xfrm>
       </p:grpSpPr>
       <p:sp>
@@ -815,9 +781,9 @@
           <a:bodyPr/>
           <a:lstStyle/>
           <a:p>
-            <a:fld id="{48DC9D99-785A-4C27-9C73-027F35A9E58A}" type="datetimeFigureOut">
-              <a:rPr lang="en-US" smtClean="0"/>
-              <a:t>1/7/2018</a:t>
+            <a:fld id="{937C1FC0-0D05-41AE-B99E-DEE5A0AB905D}" type="datetimeFigureOut">
+              <a:rPr lang="en-US" smtClean="0"/>
+              <a:t>11/7/2009</a:t>
             </a:fld>
             <a:endParaRPr lang="en-US"/>
           </a:p>
@@ -871,11 +837,12 @@
     <a:masterClrMapping/>
   </p:clrMapOvr>
   <p:transition/>
+  <p:timing/>
 </p:sldLayout>
 </file>
 
 <file path=ppt/slideLayouts/slideLayout3.xml><?xml version="1.0" encoding="utf-8"?>
-<p:sldLayout xmlns:a="http://schemas.openxmlformats.org/drawingml/2006/main" xmlns:r="http://schemas.openxmlformats.org/officeDocument/2006/relationships" xmlns:p="http://schemas.openxmlformats.org/presentationml/2006/main" type="secHead" preserve="1">
+<p:sldLayout xmlns:a="http://schemas.openxmlformats.org/drawingml/2006/main" xmlns:r="http://schemas.openxmlformats.org/officeDocument/2006/relationships" xmlns:m="http://schemas.openxmlformats.org/officeDocument/2006/math" xmlns:w="http://schemas.openxmlformats.org/wordprocessingml/2006/main" xmlns:xml="http://www.w3.org/XML/1998/namespace" xmlns:wp="http://schemas.openxmlformats.org/drawingml/2006/wordprocessingDrawing" xmlns:a14="http://schemas.microsoft.com/office/drawing/2010/main" xmlns:p14="http://schemas.microsoft.com/office/powerpoint/2010/main" xmlns:p15="http://schemas.microsoft.com/office/powerpoint/2012/main" xmlns:p159="http://schemas.microsoft.com/office/powerpoint/2015/09/main" xmlns:p="http://schemas.openxmlformats.org/presentationml/2006/main" type="secHead" preserve="1">
   <p:cSld name="Section Header">
     <p:spTree>
       <p:nvGrpSpPr>
@@ -887,8 +854,6 @@
         <a:xfrm>
           <a:off x="0" y="0"/>
           <a:ext cx="0" cy="0"/>
-          <a:chOff x="0" y="0"/>
-          <a:chExt cx="0" cy="0"/>
         </a:xfrm>
       </p:grpSpPr>
       <p:sp>
@@ -1046,9 +1011,9 @@
           <a:bodyPr/>
           <a:lstStyle/>
           <a:p>
-            <a:fld id="{E1DBD9C3-C53E-4030-AC9E-E9A11146E3CB}" type="datetimeFigureOut">
-              <a:rPr lang="en-US" smtClean="0"/>
-              <a:t>1/7/2018</a:t>
+            <a:fld id="{A0EC7466-750C-4E71-9263-0D857AF4D5E7}" type="datetimeFigureOut">
+              <a:rPr lang="en-US" smtClean="0"/>
+              <a:t>11/7/2009</a:t>
             </a:fld>
             <a:endParaRPr lang="en-US"/>
           </a:p>
@@ -1102,11 +1067,12 @@
     <a:masterClrMapping/>
   </p:clrMapOvr>
   <p:transition/>
+  <p:timing/>
 </p:sldLayout>
 </file>
 
 <file path=ppt/slideLayouts/slideLayout4.xml><?xml version="1.0" encoding="utf-8"?>
-<p:sldLayout xmlns:a="http://schemas.openxmlformats.org/drawingml/2006/main" xmlns:r="http://schemas.openxmlformats.org/officeDocument/2006/relationships" xmlns:p="http://schemas.openxmlformats.org/presentationml/2006/main" type="twoObj" preserve="1">
+<p:sldLayout xmlns:a="http://schemas.openxmlformats.org/drawingml/2006/main" xmlns:r="http://schemas.openxmlformats.org/officeDocument/2006/relationships" xmlns:m="http://schemas.openxmlformats.org/officeDocument/2006/math" xmlns:w="http://schemas.openxmlformats.org/wordprocessingml/2006/main" xmlns:xml="http://www.w3.org/XML/1998/namespace" xmlns:wp="http://schemas.openxmlformats.org/drawingml/2006/wordprocessingDrawing" xmlns:a14="http://schemas.microsoft.com/office/drawing/2010/main" xmlns:p14="http://schemas.microsoft.com/office/powerpoint/2010/main" xmlns:p15="http://schemas.microsoft.com/office/powerpoint/2012/main" xmlns:p159="http://schemas.microsoft.com/office/powerpoint/2015/09/main" xmlns:p="http://schemas.openxmlformats.org/presentationml/2006/main" type="twoObj" preserve="1">
   <p:cSld name="Two Content">
     <p:spTree>
       <p:nvGrpSpPr>
@@ -1118,8 +1084,6 @@
         <a:xfrm>
           <a:off x="0" y="0"/>
           <a:ext cx="0" cy="0"/>
-          <a:chOff x="0" y="0"/>
-          <a:chExt cx="0" cy="0"/>
         </a:xfrm>
       </p:grpSpPr>
       <p:sp>
@@ -1318,9 +1282,9 @@
           <a:bodyPr/>
           <a:lstStyle/>
           <a:p>
-            <a:fld id="{351903FE-4389-41AE-8473-30DBA71AE651}" type="datetimeFigureOut">
-              <a:rPr lang="en-US" smtClean="0"/>
-              <a:t>1/7/2018</a:t>
+            <a:fld id="{952D0342-2AB1-4262-AEC7-56588B943F52}" type="datetimeFigureOut">
+              <a:rPr lang="en-US" smtClean="0"/>
+              <a:t>11/7/2009</a:t>
             </a:fld>
             <a:endParaRPr lang="en-US"/>
           </a:p>
@@ -1374,11 +1338,12 @@
     <a:masterClrMapping/>
   </p:clrMapOvr>
   <p:transition/>
+  <p:timing/>
 </p:sldLayout>
 </file>
 
 <file path=ppt/slideLayouts/slideLayout5.xml><?xml version="1.0" encoding="utf-8"?>
-<p:sldLayout xmlns:a="http://schemas.openxmlformats.org/drawingml/2006/main" xmlns:r="http://schemas.openxmlformats.org/officeDocument/2006/relationships" xmlns:p="http://schemas.openxmlformats.org/presentationml/2006/main" type="twoTxTwoObj" preserve="1">
+<p:sldLayout xmlns:a="http://schemas.openxmlformats.org/drawingml/2006/main" xmlns:r="http://schemas.openxmlformats.org/officeDocument/2006/relationships" xmlns:m="http://schemas.openxmlformats.org/officeDocument/2006/math" xmlns:w="http://schemas.openxmlformats.org/wordprocessingml/2006/main" xmlns:xml="http://www.w3.org/XML/1998/namespace" xmlns:wp="http://schemas.openxmlformats.org/drawingml/2006/wordprocessingDrawing" xmlns:a14="http://schemas.microsoft.com/office/drawing/2010/main" xmlns:p14="http://schemas.microsoft.com/office/powerpoint/2010/main" xmlns:p15="http://schemas.microsoft.com/office/powerpoint/2012/main" xmlns:p159="http://schemas.microsoft.com/office/powerpoint/2015/09/main" xmlns:p="http://schemas.openxmlformats.org/presentationml/2006/main" type="twoTxTwoObj" preserve="1">
   <p:cSld name="Comparison">
     <p:spTree>
       <p:nvGrpSpPr>
@@ -1390,8 +1355,6 @@
         <a:xfrm>
           <a:off x="0" y="0"/>
           <a:ext cx="0" cy="0"/>
-          <a:chOff x="0" y="0"/>
-          <a:chExt cx="0" cy="0"/>
         </a:xfrm>
       </p:grpSpPr>
       <p:sp>
@@ -1708,9 +1671,9 @@
           <a:bodyPr/>
           <a:lstStyle/>
           <a:p>
-            <a:fld id="{07DB9D10-922E-4537-B395-969A38D08CEB}" type="datetimeFigureOut">
-              <a:rPr lang="en-US" smtClean="0"/>
-              <a:t>1/7/2018</a:t>
+            <a:fld id="{3393EB6C-A4E7-4EBB-81F6-8B4A01988ED6}" type="datetimeFigureOut">
+              <a:rPr lang="en-US" smtClean="0"/>
+              <a:t>11/7/2009</a:t>
             </a:fld>
             <a:endParaRPr lang="en-US"/>
           </a:p>
@@ -1764,11 +1727,12 @@
     <a:masterClrMapping/>
   </p:clrMapOvr>
   <p:transition/>
+  <p:timing/>
 </p:sldLayout>
 </file>
 
 <file path=ppt/slideLayouts/slideLayout6.xml><?xml version="1.0" encoding="utf-8"?>
-<p:sldLayout xmlns:a="http://schemas.openxmlformats.org/drawingml/2006/main" xmlns:r="http://schemas.openxmlformats.org/officeDocument/2006/relationships" xmlns:p="http://schemas.openxmlformats.org/presentationml/2006/main" type="titleOnly" preserve="1">
+<p:sldLayout xmlns:a="http://schemas.openxmlformats.org/drawingml/2006/main" xmlns:r="http://schemas.openxmlformats.org/officeDocument/2006/relationships" xmlns:m="http://schemas.openxmlformats.org/officeDocument/2006/math" xmlns:w="http://schemas.openxmlformats.org/wordprocessingml/2006/main" xmlns:xml="http://www.w3.org/XML/1998/namespace" xmlns:wp="http://schemas.openxmlformats.org/drawingml/2006/wordprocessingDrawing" xmlns:a14="http://schemas.microsoft.com/office/drawing/2010/main" xmlns:p14="http://schemas.microsoft.com/office/powerpoint/2010/main" xmlns:p15="http://schemas.microsoft.com/office/powerpoint/2012/main" xmlns:p159="http://schemas.microsoft.com/office/powerpoint/2015/09/main" xmlns:p="http://schemas.openxmlformats.org/presentationml/2006/main" type="titleOnly" preserve="1">
   <p:cSld name="Title Only">
     <p:spTree>
       <p:nvGrpSpPr>
@@ -1780,8 +1744,6 @@
         <a:xfrm>
           <a:off x="0" y="0"/>
           <a:ext cx="0" cy="0"/>
-          <a:chOff x="0" y="0"/>
-          <a:chExt cx="0" cy="0"/>
         </a:xfrm>
       </p:grpSpPr>
       <p:sp>
@@ -1822,9 +1784,9 @@
           <a:bodyPr/>
           <a:lstStyle/>
           <a:p>
-            <a:fld id="{9628AC34-970A-4E32-99D7-119E6D4A7943}" type="datetimeFigureOut">
-              <a:rPr lang="en-US" smtClean="0"/>
-              <a:t>1/7/2018</a:t>
+            <a:fld id="{111DB077-E5EA-4376-91B8-D5DA1C1D2C3D}" type="datetimeFigureOut">
+              <a:rPr lang="en-US" smtClean="0"/>
+              <a:t>11/7/2009</a:t>
             </a:fld>
             <a:endParaRPr lang="en-US"/>
           </a:p>
@@ -1878,11 +1840,12 @@
     <a:masterClrMapping/>
   </p:clrMapOvr>
   <p:transition/>
+  <p:timing/>
 </p:sldLayout>
 </file>
 
 <file path=ppt/slideLayouts/slideLayout7.xml><?xml version="1.0" encoding="utf-8"?>
-<p:sldLayout xmlns:a="http://schemas.openxmlformats.org/drawingml/2006/main" xmlns:r="http://schemas.openxmlformats.org/officeDocument/2006/relationships" xmlns:p="http://schemas.openxmlformats.org/presentationml/2006/main" type="blank" preserve="1">
+<p:sldLayout xmlns:a="http://schemas.openxmlformats.org/drawingml/2006/main" xmlns:r="http://schemas.openxmlformats.org/officeDocument/2006/relationships" xmlns:m="http://schemas.openxmlformats.org/officeDocument/2006/math" xmlns:w="http://schemas.openxmlformats.org/wordprocessingml/2006/main" xmlns:xml="http://www.w3.org/XML/1998/namespace" xmlns:wp="http://schemas.openxmlformats.org/drawingml/2006/wordprocessingDrawing" xmlns:a14="http://schemas.microsoft.com/office/drawing/2010/main" xmlns:p14="http://schemas.microsoft.com/office/powerpoint/2010/main" xmlns:p15="http://schemas.microsoft.com/office/powerpoint/2012/main" xmlns:p159="http://schemas.microsoft.com/office/powerpoint/2015/09/main" xmlns:p="http://schemas.openxmlformats.org/presentationml/2006/main" type="blank" preserve="1">
   <p:cSld name="Blank">
     <p:spTree>
       <p:nvGrpSpPr>
@@ -1894,8 +1857,6 @@
         <a:xfrm>
           <a:off x="0" y="0"/>
           <a:ext cx="0" cy="0"/>
-          <a:chOff x="0" y="0"/>
-          <a:chExt cx="0" cy="0"/>
         </a:xfrm>
       </p:grpSpPr>
       <p:sp>
@@ -1913,9 +1874,9 @@
           <a:bodyPr/>
           <a:lstStyle/>
           <a:p>
-            <a:fld id="{F04C616C-7EDD-4151-90B4-410A539C3997}" type="datetimeFigureOut">
-              <a:rPr lang="en-US" smtClean="0"/>
-              <a:t>1/7/2018</a:t>
+            <a:fld id="{4D1D2C6F-2E06-4C2A-BBE3-8AEC858AE591}" type="datetimeFigureOut">
+              <a:rPr lang="en-US" smtClean="0"/>
+              <a:t>11/7/2009</a:t>
             </a:fld>
             <a:endParaRPr lang="en-US"/>
           </a:p>
@@ -1969,11 +1930,12 @@
     <a:masterClrMapping/>
   </p:clrMapOvr>
   <p:transition/>
+  <p:timing/>
 </p:sldLayout>
 </file>
 
 <file path=ppt/slideLayouts/slideLayout8.xml><?xml version="1.0" encoding="utf-8"?>
-<p:sldLayout xmlns:a="http://schemas.openxmlformats.org/drawingml/2006/main" xmlns:r="http://schemas.openxmlformats.org/officeDocument/2006/relationships" xmlns:p="http://schemas.openxmlformats.org/presentationml/2006/main" type="objTx" preserve="1">
+<p:sldLayout xmlns:a="http://schemas.openxmlformats.org/drawingml/2006/main" xmlns:r="http://schemas.openxmlformats.org/officeDocument/2006/relationships" xmlns:m="http://schemas.openxmlformats.org/officeDocument/2006/math" xmlns:w="http://schemas.openxmlformats.org/wordprocessingml/2006/main" xmlns:xml="http://www.w3.org/XML/1998/namespace" xmlns:wp="http://schemas.openxmlformats.org/drawingml/2006/wordprocessingDrawing" xmlns:a14="http://schemas.microsoft.com/office/drawing/2010/main" xmlns:p14="http://schemas.microsoft.com/office/powerpoint/2010/main" xmlns:p15="http://schemas.microsoft.com/office/powerpoint/2012/main" xmlns:p159="http://schemas.microsoft.com/office/powerpoint/2015/09/main" xmlns:p="http://schemas.openxmlformats.org/presentationml/2006/main" type="objTx" preserve="1">
   <p:cSld name="Content with Caption">
     <p:spTree>
       <p:nvGrpSpPr>
@@ -1985,8 +1947,6 @@
         <a:xfrm>
           <a:off x="0" y="0"/>
           <a:ext cx="0" cy="0"/>
-          <a:chOff x="0" y="0"/>
-          <a:chExt cx="0" cy="0"/>
         </a:xfrm>
       </p:grpSpPr>
       <p:sp>
@@ -2169,9 +2129,9 @@
           <a:bodyPr/>
           <a:lstStyle/>
           <a:p>
-            <a:fld id="{6FE191F2-76EA-4374-BAD7-290C7DE0D2AC}" type="datetimeFigureOut">
-              <a:rPr lang="en-US" smtClean="0"/>
-              <a:t>1/7/2018</a:t>
+            <a:fld id="{9F0AE9F1-47E8-4FD0-B99C-4E33419E3275}" type="datetimeFigureOut">
+              <a:rPr lang="en-US" smtClean="0"/>
+              <a:t>11/7/2009</a:t>
             </a:fld>
             <a:endParaRPr lang="en-US"/>
           </a:p>
@@ -2225,11 +2185,12 @@
     <a:masterClrMapping/>
   </p:clrMapOvr>
   <p:transition/>
+  <p:timing/>
 </p:sldLayout>
 </file>
 
 <file path=ppt/slideLayouts/slideLayout9.xml><?xml version="1.0" encoding="utf-8"?>
-<p:sldLayout xmlns:a="http://schemas.openxmlformats.org/drawingml/2006/main" xmlns:r="http://schemas.openxmlformats.org/officeDocument/2006/relationships" xmlns:p="http://schemas.openxmlformats.org/presentationml/2006/main" type="picTx" preserve="1">
+<p:sldLayout xmlns:a="http://schemas.openxmlformats.org/drawingml/2006/main" xmlns:r="http://schemas.openxmlformats.org/officeDocument/2006/relationships" xmlns:m="http://schemas.openxmlformats.org/officeDocument/2006/math" xmlns:w="http://schemas.openxmlformats.org/wordprocessingml/2006/main" xmlns:xml="http://www.w3.org/XML/1998/namespace" xmlns:wp="http://schemas.openxmlformats.org/drawingml/2006/wordprocessingDrawing" xmlns:a14="http://schemas.microsoft.com/office/drawing/2010/main" xmlns:p14="http://schemas.microsoft.com/office/powerpoint/2010/main" xmlns:p15="http://schemas.microsoft.com/office/powerpoint/2012/main" xmlns:p159="http://schemas.microsoft.com/office/powerpoint/2015/09/main" xmlns:p="http://schemas.openxmlformats.org/presentationml/2006/main" type="picTx" preserve="1">
   <p:cSld name="Picture with Caption">
     <p:spTree>
       <p:nvGrpSpPr>
@@ -2241,8 +2202,6 @@
         <a:xfrm>
           <a:off x="0" y="0"/>
           <a:ext cx="0" cy="0"/>
-          <a:chOff x="0" y="0"/>
-          <a:chExt cx="0" cy="0"/>
         </a:xfrm>
       </p:grpSpPr>
       <p:sp>
@@ -2402,9 +2361,9 @@
           <a:bodyPr/>
           <a:lstStyle/>
           <a:p>
-            <a:fld id="{C9A331FF-75B7-4853-87B5-37C9F46D020F}" type="datetimeFigureOut">
-              <a:rPr lang="en-US" smtClean="0"/>
-              <a:t>1/7/2018</a:t>
+            <a:fld id="{A035CC76-229E-4AB9-B664-1E01C3D95228}" type="datetimeFigureOut">
+              <a:rPr lang="en-US" smtClean="0"/>
+              <a:t>11/7/2009</a:t>
             </a:fld>
             <a:endParaRPr lang="en-US"/>
           </a:p>
@@ -2458,11 +2417,12 @@
     <a:masterClrMapping/>
   </p:clrMapOvr>
   <p:transition/>
+  <p:timing/>
 </p:sldLayout>
 </file>
 
 <file path=ppt/slideMasters/slideMaster1.xml><?xml version="1.0" encoding="utf-8"?>
-<p:sldMaster xmlns:a="http://schemas.openxmlformats.org/drawingml/2006/main" xmlns:r="http://schemas.openxmlformats.org/officeDocument/2006/relationships" xmlns:p="http://schemas.openxmlformats.org/presentationml/2006/main">
+<p:sldMaster xmlns:a="http://schemas.openxmlformats.org/drawingml/2006/main" xmlns:r="http://schemas.openxmlformats.org/officeDocument/2006/relationships" xmlns:m="http://schemas.openxmlformats.org/officeDocument/2006/math" xmlns:w="http://schemas.openxmlformats.org/wordprocessingml/2006/main" xmlns:xml="http://www.w3.org/XML/1998/namespace" xmlns:wp="http://schemas.openxmlformats.org/drawingml/2006/wordprocessingDrawing" xmlns:a14="http://schemas.microsoft.com/office/drawing/2010/main" xmlns:p14="http://schemas.microsoft.com/office/powerpoint/2010/main" xmlns:p15="http://schemas.microsoft.com/office/powerpoint/2012/main" xmlns:p159="http://schemas.microsoft.com/office/powerpoint/2015/09/main" xmlns:p="http://schemas.openxmlformats.org/presentationml/2006/main">
   <p:cSld>
     <p:bg>
       <p:bgRef idx="1001">
@@ -2479,8 +2439,6 @@
         <a:xfrm>
           <a:off x="0" y="0"/>
           <a:ext cx="0" cy="0"/>
-          <a:chOff x="0" y="0"/>
-          <a:chExt cx="0" cy="0"/>
         </a:xfrm>
       </p:grpSpPr>
       <p:sp>
@@ -2612,7 +2570,7 @@
           <a:p>
             <a:fld id="{E8FD0B7A-F5DD-4F40-B4CB-3B2C354B893A}" type="datetimeFigureOut">
               <a:rPr lang="en-US" smtClean="0"/>
-              <a:t>1/7/2018</a:t>
+              <a:t>11/7/2009</a:t>
             </a:fld>
             <a:endParaRPr lang="en-US"/>
           </a:p>
@@ -2713,6 +2671,7 @@
     <p:sldLayoutId id="2147483659" r:id="rId11"/>
   </p:sldLayoutIdLst>
   <p:transition/>
+  <p:timing/>
   <p:txStyles>
     <p:titleStyle>
       <a:lvl1pPr algn="ctr" defTabSz="914400" rtl="0" eaLnBrk="1" latinLnBrk="0" hangingPunct="1">
@@ -2967,8 +2926,8 @@
 </file>
 
 <file path=ppt/slides/slide1.xml><?xml version="1.0" encoding="utf-8"?>
-<p:sld xmlns:a="http://schemas.openxmlformats.org/drawingml/2006/main" xmlns:r="http://schemas.openxmlformats.org/officeDocument/2006/relationships" xmlns:p="http://schemas.openxmlformats.org/presentationml/2006/main">
-  <p:cSld>
+<p:sld xmlns:a="http://schemas.openxmlformats.org/drawingml/2006/main" xmlns:r="http://schemas.openxmlformats.org/officeDocument/2006/relationships" xmlns:m="http://schemas.openxmlformats.org/officeDocument/2006/math" xmlns:w="http://schemas.openxmlformats.org/wordprocessingml/2006/main" xmlns:xml="http://www.w3.org/XML/1998/namespace" xmlns:wp="http://schemas.openxmlformats.org/drawingml/2006/wordprocessingDrawing" xmlns:a14="http://schemas.microsoft.com/office/drawing/2010/main" xmlns:p14="http://schemas.microsoft.com/office/powerpoint/2010/main" xmlns:p15="http://schemas.microsoft.com/office/powerpoint/2012/main" xmlns:p159="http://schemas.microsoft.com/office/powerpoint/2015/09/main" xmlns:p="http://schemas.openxmlformats.org/presentationml/2006/main">
+  <p:cSld name="">
     <p:spTree>
       <p:nvGrpSpPr>
         <p:cNvPr id="1" name=""/>
@@ -2979,22 +2938,92 @@
         <a:xfrm>
           <a:off x="0" y="0"/>
           <a:ext cx="0" cy="0"/>
-          <a:chOff x="0" y="0"/>
-          <a:chExt cx="0" cy="0"/>
         </a:xfrm>
       </p:grpSpPr>
+      <p:sp>
+        <p:nvSpPr>
+          <p:cNvPr id="1" name="TextBox"/>
+          <p:cNvSpPr txBox="1">
+            <a:spLocks noGrp="1" noSelect="1" noRot="1" noMove="1"/>
+          </p:cNvSpPr>
+          <p:nvPr/>
+        </p:nvSpPr>
+        <p:spPr>
+          <a:xfrm>
+            <a:off x="1366520" y="2644140"/>
+            <a:ext cx="6411372" cy="1569660"/>
+          </a:xfrm>
+          <a:prstGeom prst="rect">
+            <a:avLst/>
+          </a:prstGeom>
+          <a:noFill/>
+        </p:spPr>
+        <p:txBody>
+          <a:bodyPr wrap="none" rtlCol="0" anchor="ctr" anchorCtr="1">
+            <a:spAutoFit/>
+          </a:bodyPr>
+          <a:lstStyle>
+            <a:lvl1pPr algn="l">
+              <a:lnSpc>
+                <a:spcPct val="150000"/>
+              </a:lnSpc>
+              <a:spcBef>
+                <a:spcPct val="0"/>
+              </a:spcBef>
+              <a:spcAft>
+                <a:spcPct val="0"/>
+              </a:spcAft>
+              <a:defRPr lang="en-US" sz="3200" b="1" noProof="1" dirty="0">
+                <a:solidFill>
+                  <a:prstClr val="red">
+                    <a:lumOff val="30000"/>
+                    <a:alpha val="40000"/>
+                  </a:prstClr>
+                </a:solidFill>
+                <a:effectLst>
+                  <a:outerShdw blurRad="50800" dist="38100" algn="tr" rotWithShape="0">
+                    <a:prstClr val="black">
+                      <a:alpha val="80000"/>
+                    </a:prstClr>
+                  </a:outerShdw>
+                </a:effectLst>
+                <a:latin typeface="Calibri" pitchFamily="34" charset="0"/>
+              </a:defRPr>
+            </a:lvl1pPr>
+          </a:lstStyle>
+          <a:p>
+            <a:pPr algn="ctr"/>
+            <a:r>
+              <a:t>Evaluation only.</a:t>
+            </a:r>
+          </a:p>
+          <a:p>
+            <a:pPr algn="ctr"/>
+            <a:r>
+              <a:t>Created with Aspose.Slides for C++ 20.3.</a:t>
+            </a:r>
+          </a:p>
+          <a:p>
+            <a:pPr algn="ctr"/>
+            <a:r>
+              <a:t>Copyright 2004-2020Aspose Pty Ltd.</a:t>
+            </a:r>
+          </a:p>
+        </p:txBody>
+      </p:sp>
     </p:spTree>
   </p:cSld>
   <p:clrMapOvr>
     <a:masterClrMapping/>
   </p:clrMapOvr>
   <p:transition/>
+  <p:timing/>
 </p:sld>
 </file>
 
 <file path=ppt/slides/slide10.xml><?xml version="1.0" encoding="utf-8"?>
-<p:sld xmlns:a="http://schemas.openxmlformats.org/drawingml/2006/main" xmlns:r="http://schemas.openxmlformats.org/officeDocument/2006/relationships" xmlns:p="http://schemas.openxmlformats.org/presentationml/2006/main">
-  <p:cSld>
+<p:sld xmlns:a="http://schemas.openxmlformats.org/drawingml/2006/main" xmlns:r="http://schemas.openxmlformats.org/officeDocument/2006/relationships" xmlns:m="http://schemas.openxmlformats.org/officeDocument/2006/math" xmlns:w="http://schemas.openxmlformats.org/wordprocessingml/2006/main" xmlns:xml="http://www.w3.org/XML/1998/namespace" xmlns:wp="http://schemas.openxmlformats.org/drawingml/2006/wordprocessingDrawing" xmlns:a14="http://schemas.microsoft.com/office/drawing/2010/main" xmlns:p14="http://schemas.microsoft.com/office/powerpoint/2010/main" xmlns:p15="http://schemas.microsoft.com/office/powerpoint/2012/main" xmlns:p159="http://schemas.microsoft.com/office/powerpoint/2015/09/main" xmlns:p="http://schemas.openxmlformats.org/presentationml/2006/main">
+  <p:cSld name="">
     <p:spTree>
       <p:nvGrpSpPr>
         <p:cNvPr id="1" name=""/>
@@ -3005,8 +3034,6 @@
         <a:xfrm>
           <a:off x="0" y="0"/>
           <a:ext cx="0" cy="0"/>
-          <a:chOff x="0" y="0"/>
-          <a:chExt cx="0" cy="0"/>
         </a:xfrm>
       </p:grpSpPr>
       <p:sp>
@@ -3030,7 +3057,7 @@
           <a:p>
             <a:r>
               <a:rPr lang="en-US" smtClean="0"/>
-              <a:t>Click to edit Master title style</a:t>
+              <a:t>Click... text has been truncated due to evaluation version limitation.</a:t>
             </a:r>
             <a:endParaRPr lang="en-US"/>
           </a:p>
@@ -3146,7 +3173,78 @@
           <a:p>
             <a:r>
               <a:rPr lang="en-US" smtClean="0"/>
-              <a:t>Click to edit Master text styles</a:t>
+              <a:t>Click... text has been truncated due to evaluation version limitation.</a:t>
+            </a:r>
+          </a:p>
+        </p:txBody>
+      </p:sp>
+      <p:sp>
+        <p:nvSpPr>
+          <p:cNvPr id="5" name="TextBox"/>
+          <p:cNvSpPr txBox="1">
+            <a:spLocks noGrp="1" noSelect="1" noRot="1" noMove="1"/>
+          </p:cNvSpPr>
+          <p:nvPr/>
+        </p:nvSpPr>
+        <p:spPr>
+          <a:xfrm>
+            <a:off x="1366520" y="2644140"/>
+            <a:ext cx="6411372" cy="1569660"/>
+          </a:xfrm>
+          <a:prstGeom prst="rect">
+            <a:avLst/>
+          </a:prstGeom>
+          <a:noFill/>
+        </p:spPr>
+        <p:txBody>
+          <a:bodyPr wrap="none" rtlCol="0" anchor="ctr" anchorCtr="1">
+            <a:spAutoFit/>
+          </a:bodyPr>
+          <a:lstStyle>
+            <a:lvl1pPr algn="l">
+              <a:lnSpc>
+                <a:spcPct val="150000"/>
+              </a:lnSpc>
+              <a:spcBef>
+                <a:spcPct val="0"/>
+              </a:spcBef>
+              <a:spcAft>
+                <a:spcPct val="0"/>
+              </a:spcAft>
+              <a:defRPr lang="en-US" sz="3200" b="1" noProof="1" dirty="0">
+                <a:solidFill>
+                  <a:prstClr val="red">
+                    <a:lumOff val="30000"/>
+                    <a:alpha val="40000"/>
+                  </a:prstClr>
+                </a:solidFill>
+                <a:effectLst>
+                  <a:outerShdw blurRad="50800" dist="38100" algn="tr" rotWithShape="0">
+                    <a:prstClr val="black">
+                      <a:alpha val="80000"/>
+                    </a:prstClr>
+                  </a:outerShdw>
+                </a:effectLst>
+                <a:latin typeface="Calibri" pitchFamily="34" charset="0"/>
+              </a:defRPr>
+            </a:lvl1pPr>
+          </a:lstStyle>
+          <a:p>
+            <a:pPr algn="ctr"/>
+            <a:r>
+              <a:t>Evaluation only.</a:t>
+            </a:r>
+          </a:p>
+          <a:p>
+            <a:pPr algn="ctr"/>
+            <a:r>
+              <a:t>Created with Aspose.Slides for C++ 20.3.</a:t>
+            </a:r>
+          </a:p>
+          <a:p>
+            <a:pPr algn="ctr"/>
+            <a:r>
+              <a:t>Copyright 2004-2020Aspose Pty Ltd.</a:t>
             </a:r>
           </a:p>
         </p:txBody>
@@ -3157,12 +3255,13 @@
     <a:masterClrMapping/>
   </p:clrMapOvr>
   <p:transition/>
+  <p:timing/>
 </p:sld>
 </file>
 
 <file path=ppt/slides/slide11.xml><?xml version="1.0" encoding="utf-8"?>
-<p:sld xmlns:a="http://schemas.openxmlformats.org/drawingml/2006/main" xmlns:r="http://schemas.openxmlformats.org/officeDocument/2006/relationships" xmlns:p="http://schemas.openxmlformats.org/presentationml/2006/main">
-  <p:cSld>
+<p:sld xmlns:a="http://schemas.openxmlformats.org/drawingml/2006/main" xmlns:r="http://schemas.openxmlformats.org/officeDocument/2006/relationships" xmlns:m="http://schemas.openxmlformats.org/officeDocument/2006/math" xmlns:w="http://schemas.openxmlformats.org/wordprocessingml/2006/main" xmlns:xml="http://www.w3.org/XML/1998/namespace" xmlns:wp="http://schemas.openxmlformats.org/drawingml/2006/wordprocessingDrawing" xmlns:a14="http://schemas.microsoft.com/office/drawing/2010/main" xmlns:p14="http://schemas.microsoft.com/office/powerpoint/2010/main" xmlns:p15="http://schemas.microsoft.com/office/powerpoint/2012/main" xmlns:p159="http://schemas.microsoft.com/office/powerpoint/2015/09/main" xmlns:p="http://schemas.openxmlformats.org/presentationml/2006/main">
+  <p:cSld name="">
     <p:spTree>
       <p:nvGrpSpPr>
         <p:cNvPr id="1" name=""/>
@@ -3173,8 +3272,6 @@
         <a:xfrm>
           <a:off x="0" y="0"/>
           <a:ext cx="0" cy="0"/>
-          <a:chOff x="0" y="0"/>
-          <a:chExt cx="0" cy="0"/>
         </a:xfrm>
       </p:grpSpPr>
       <p:sp>
@@ -3194,7 +3291,7 @@
           <a:p>
             <a:r>
               <a:rPr lang="en-US" smtClean="0"/>
-              <a:t>Click to edit Master title style</a:t>
+              <a:t>Click... text has been truncated due to evaluation version limitation.</a:t>
             </a:r>
             <a:endParaRPr lang="en-US"/>
           </a:p>
@@ -3217,7 +3314,78 @@
           <a:p>
             <a:r>
               <a:rPr lang="en-US" smtClean="0"/>
-              <a:t>Click to edit Master text styles</a:t>
+              <a:t>Click... text has been truncated due to evaluation version limitation.</a:t>
+            </a:r>
+          </a:p>
+        </p:txBody>
+      </p:sp>
+      <p:sp>
+        <p:nvSpPr>
+          <p:cNvPr id="4" name="TextBox"/>
+          <p:cNvSpPr txBox="1">
+            <a:spLocks noGrp="1" noSelect="1" noRot="1" noMove="1"/>
+          </p:cNvSpPr>
+          <p:nvPr/>
+        </p:nvSpPr>
+        <p:spPr>
+          <a:xfrm>
+            <a:off x="1366520" y="2644140"/>
+            <a:ext cx="6411372" cy="1569660"/>
+          </a:xfrm>
+          <a:prstGeom prst="rect">
+            <a:avLst/>
+          </a:prstGeom>
+          <a:noFill/>
+        </p:spPr>
+        <p:txBody>
+          <a:bodyPr wrap="none" rtlCol="0" anchor="ctr" anchorCtr="1">
+            <a:spAutoFit/>
+          </a:bodyPr>
+          <a:lstStyle>
+            <a:lvl1pPr algn="l">
+              <a:lnSpc>
+                <a:spcPct val="150000"/>
+              </a:lnSpc>
+              <a:spcBef>
+                <a:spcPct val="0"/>
+              </a:spcBef>
+              <a:spcAft>
+                <a:spcPct val="0"/>
+              </a:spcAft>
+              <a:defRPr lang="en-US" sz="3200" b="1" noProof="1" dirty="0">
+                <a:solidFill>
+                  <a:prstClr val="red">
+                    <a:lumOff val="30000"/>
+                    <a:alpha val="40000"/>
+                  </a:prstClr>
+                </a:solidFill>
+                <a:effectLst>
+                  <a:outerShdw blurRad="50800" dist="38100" algn="tr" rotWithShape="0">
+                    <a:prstClr val="black">
+                      <a:alpha val="80000"/>
+                    </a:prstClr>
+                  </a:outerShdw>
+                </a:effectLst>
+                <a:latin typeface="Calibri" pitchFamily="34" charset="0"/>
+              </a:defRPr>
+            </a:lvl1pPr>
+          </a:lstStyle>
+          <a:p>
+            <a:pPr algn="ctr"/>
+            <a:r>
+              <a:t>Evaluation only.</a:t>
+            </a:r>
+          </a:p>
+          <a:p>
+            <a:pPr algn="ctr"/>
+            <a:r>
+              <a:t>Created with Aspose.Slides for C++ 20.3.</a:t>
+            </a:r>
+          </a:p>
+          <a:p>
+            <a:pPr algn="ctr"/>
+            <a:r>
+              <a:t>Copyright 2004-2020Aspose Pty Ltd.</a:t>
             </a:r>
           </a:p>
         </p:txBody>
@@ -3228,12 +3396,13 @@
     <a:masterClrMapping/>
   </p:clrMapOvr>
   <p:transition/>
+  <p:timing/>
 </p:sld>
 </file>
 
 <file path=ppt/slides/slide12.xml><?xml version="1.0" encoding="utf-8"?>
-<p:sld xmlns:a="http://schemas.openxmlformats.org/drawingml/2006/main" xmlns:r="http://schemas.openxmlformats.org/officeDocument/2006/relationships" xmlns:p="http://schemas.openxmlformats.org/presentationml/2006/main">
-  <p:cSld>
+<p:sld xmlns:a="http://schemas.openxmlformats.org/drawingml/2006/main" xmlns:r="http://schemas.openxmlformats.org/officeDocument/2006/relationships" xmlns:m="http://schemas.openxmlformats.org/officeDocument/2006/math" xmlns:w="http://schemas.openxmlformats.org/wordprocessingml/2006/main" xmlns:xml="http://www.w3.org/XML/1998/namespace" xmlns:wp="http://schemas.openxmlformats.org/drawingml/2006/wordprocessingDrawing" xmlns:a14="http://schemas.microsoft.com/office/drawing/2010/main" xmlns:p14="http://schemas.microsoft.com/office/powerpoint/2010/main" xmlns:p15="http://schemas.microsoft.com/office/powerpoint/2012/main" xmlns:p159="http://schemas.microsoft.com/office/powerpoint/2015/09/main" xmlns:p="http://schemas.openxmlformats.org/presentationml/2006/main">
+  <p:cSld name="">
     <p:spTree>
       <p:nvGrpSpPr>
         <p:cNvPr id="1" name=""/>
@@ -3244,8 +3413,6 @@
         <a:xfrm>
           <a:off x="0" y="0"/>
           <a:ext cx="0" cy="0"/>
-          <a:chOff x="0" y="0"/>
-          <a:chExt cx="0" cy="0"/>
         </a:xfrm>
       </p:grpSpPr>
       <p:sp>
@@ -3265,7 +3432,7 @@
           <a:p>
             <a:r>
               <a:rPr lang="en-US" smtClean="0"/>
-              <a:t>Click to edit Master title style</a:t>
+              <a:t>Click... text has been truncated due to evaluation version limitation.</a:t>
             </a:r>
             <a:endParaRPr lang="en-US"/>
           </a:p>
@@ -3288,7 +3455,78 @@
           <a:p>
             <a:r>
               <a:rPr lang="en-US" smtClean="0"/>
-              <a:t>Click to edit Master text styles</a:t>
+              <a:t>Click... text has been truncated due to evaluation version limitation.</a:t>
+            </a:r>
+          </a:p>
+        </p:txBody>
+      </p:sp>
+      <p:sp>
+        <p:nvSpPr>
+          <p:cNvPr id="4" name="TextBox"/>
+          <p:cNvSpPr txBox="1">
+            <a:spLocks noGrp="1" noSelect="1" noRot="1" noMove="1"/>
+          </p:cNvSpPr>
+          <p:nvPr/>
+        </p:nvSpPr>
+        <p:spPr>
+          <a:xfrm>
+            <a:off x="1366520" y="2644140"/>
+            <a:ext cx="6411372" cy="1569660"/>
+          </a:xfrm>
+          <a:prstGeom prst="rect">
+            <a:avLst/>
+          </a:prstGeom>
+          <a:noFill/>
+        </p:spPr>
+        <p:txBody>
+          <a:bodyPr wrap="none" rtlCol="0" anchor="ctr" anchorCtr="1">
+            <a:spAutoFit/>
+          </a:bodyPr>
+          <a:lstStyle>
+            <a:lvl1pPr algn="l">
+              <a:lnSpc>
+                <a:spcPct val="150000"/>
+              </a:lnSpc>
+              <a:spcBef>
+                <a:spcPct val="0"/>
+              </a:spcBef>
+              <a:spcAft>
+                <a:spcPct val="0"/>
+              </a:spcAft>
+              <a:defRPr lang="en-US" sz="3200" b="1" noProof="1" dirty="0">
+                <a:solidFill>
+                  <a:prstClr val="red">
+                    <a:lumOff val="30000"/>
+                    <a:alpha val="40000"/>
+                  </a:prstClr>
+                </a:solidFill>
+                <a:effectLst>
+                  <a:outerShdw blurRad="50800" dist="38100" algn="tr" rotWithShape="0">
+                    <a:prstClr val="black">
+                      <a:alpha val="80000"/>
+                    </a:prstClr>
+                  </a:outerShdw>
+                </a:effectLst>
+                <a:latin typeface="Calibri" pitchFamily="34" charset="0"/>
+              </a:defRPr>
+            </a:lvl1pPr>
+          </a:lstStyle>
+          <a:p>
+            <a:pPr algn="ctr"/>
+            <a:r>
+              <a:t>Evaluation only.</a:t>
+            </a:r>
+          </a:p>
+          <a:p>
+            <a:pPr algn="ctr"/>
+            <a:r>
+              <a:t>Created with Aspose.Slides for C++ 20.3.</a:t>
+            </a:r>
+          </a:p>
+          <a:p>
+            <a:pPr algn="ctr"/>
+            <a:r>
+              <a:t>Copyright 2004-2020Aspose Pty Ltd.</a:t>
             </a:r>
           </a:p>
         </p:txBody>
@@ -3299,12 +3537,13 @@
     <a:masterClrMapping/>
   </p:clrMapOvr>
   <p:transition/>
+  <p:timing/>
 </p:sld>
 </file>
 
 <file path=ppt/slides/slide2.xml><?xml version="1.0" encoding="utf-8"?>
-<p:sld xmlns:a="http://schemas.openxmlformats.org/drawingml/2006/main" xmlns:r="http://schemas.openxmlformats.org/officeDocument/2006/relationships" xmlns:p="http://schemas.openxmlformats.org/presentationml/2006/main">
-  <p:cSld>
+<p:sld xmlns:a="http://schemas.openxmlformats.org/drawingml/2006/main" xmlns:r="http://schemas.openxmlformats.org/officeDocument/2006/relationships" xmlns:m="http://schemas.openxmlformats.org/officeDocument/2006/math" xmlns:w="http://schemas.openxmlformats.org/wordprocessingml/2006/main" xmlns:xml="http://www.w3.org/XML/1998/namespace" xmlns:wp="http://schemas.openxmlformats.org/drawingml/2006/wordprocessingDrawing" xmlns:a14="http://schemas.microsoft.com/office/drawing/2010/main" xmlns:p14="http://schemas.microsoft.com/office/powerpoint/2010/main" xmlns:p15="http://schemas.microsoft.com/office/powerpoint/2012/main" xmlns:p159="http://schemas.microsoft.com/office/powerpoint/2015/09/main" xmlns:p="http://schemas.openxmlformats.org/presentationml/2006/main">
+  <p:cSld name="">
     <p:spTree>
       <p:nvGrpSpPr>
         <p:cNvPr id="1" name=""/>
@@ -3315,8 +3554,6 @@
         <a:xfrm>
           <a:off x="0" y="0"/>
           <a:ext cx="0" cy="0"/>
-          <a:chOff x="0" y="0"/>
-          <a:chExt cx="0" cy="0"/>
         </a:xfrm>
       </p:grpSpPr>
       <p:sp>
@@ -3336,7 +3573,7 @@
           <a:p>
             <a:r>
               <a:rPr lang="en-US" smtClean="0"/>
-              <a:t>Click to edit Master title style</a:t>
+              <a:t>Click... text has been truncated due to evaluation version limitation.</a:t>
             </a:r>
             <a:endParaRPr lang="en-US"/>
           </a:p>
@@ -3450,9 +3687,80 @@
           <a:p>
             <a:r>
               <a:rPr lang="en-US" smtClean="0"/>
-              <a:t>Click to edit Master subtitle style</a:t>
-            </a:r>
-            <a:endParaRPr lang="en-US"/>
+              <a:t>Click... text has been truncated due to evaluation version limitation.</a:t>
+            </a:r>
+            <a:endParaRPr lang="en-US"/>
+          </a:p>
+        </p:txBody>
+      </p:sp>
+      <p:sp>
+        <p:nvSpPr>
+          <p:cNvPr id="4" name="TextBox"/>
+          <p:cNvSpPr txBox="1">
+            <a:spLocks noGrp="1" noSelect="1" noRot="1" noMove="1"/>
+          </p:cNvSpPr>
+          <p:nvPr/>
+        </p:nvSpPr>
+        <p:spPr>
+          <a:xfrm>
+            <a:off x="1366520" y="2644140"/>
+            <a:ext cx="6411372" cy="1569660"/>
+          </a:xfrm>
+          <a:prstGeom prst="rect">
+            <a:avLst/>
+          </a:prstGeom>
+          <a:noFill/>
+        </p:spPr>
+        <p:txBody>
+          <a:bodyPr wrap="none" rtlCol="0" anchor="ctr" anchorCtr="1">
+            <a:spAutoFit/>
+          </a:bodyPr>
+          <a:lstStyle>
+            <a:lvl1pPr algn="l">
+              <a:lnSpc>
+                <a:spcPct val="150000"/>
+              </a:lnSpc>
+              <a:spcBef>
+                <a:spcPct val="0"/>
+              </a:spcBef>
+              <a:spcAft>
+                <a:spcPct val="0"/>
+              </a:spcAft>
+              <a:defRPr lang="en-US" sz="3200" b="1" noProof="1" dirty="0">
+                <a:solidFill>
+                  <a:prstClr val="red">
+                    <a:lumOff val="30000"/>
+                    <a:alpha val="40000"/>
+                  </a:prstClr>
+                </a:solidFill>
+                <a:effectLst>
+                  <a:outerShdw blurRad="50800" dist="38100" algn="tr" rotWithShape="0">
+                    <a:prstClr val="black">
+                      <a:alpha val="80000"/>
+                    </a:prstClr>
+                  </a:outerShdw>
+                </a:effectLst>
+                <a:latin typeface="Calibri" pitchFamily="34" charset="0"/>
+              </a:defRPr>
+            </a:lvl1pPr>
+          </a:lstStyle>
+          <a:p>
+            <a:pPr algn="ctr"/>
+            <a:r>
+              <a:t>Evaluation only.</a:t>
+            </a:r>
+          </a:p>
+          <a:p>
+            <a:pPr algn="ctr"/>
+            <a:r>
+              <a:t>Created with Aspose.Slides for C++ 20.3.</a:t>
+            </a:r>
+          </a:p>
+          <a:p>
+            <a:pPr algn="ctr"/>
+            <a:r>
+              <a:t>Copyright 2004-2020Aspose Pty Ltd.</a:t>
+            </a:r>
           </a:p>
         </p:txBody>
       </p:sp>
@@ -3462,12 +3770,13 @@
     <a:masterClrMapping/>
   </p:clrMapOvr>
   <p:transition/>
+  <p:timing/>
 </p:sld>
 </file>
 
 <file path=ppt/slides/slide3.xml><?xml version="1.0" encoding="utf-8"?>
-<p:sld xmlns:a="http://schemas.openxmlformats.org/drawingml/2006/main" xmlns:r="http://schemas.openxmlformats.org/officeDocument/2006/relationships" xmlns:p="http://schemas.openxmlformats.org/presentationml/2006/main">
-  <p:cSld>
+<p:sld xmlns:a="http://schemas.openxmlformats.org/drawingml/2006/main" xmlns:r="http://schemas.openxmlformats.org/officeDocument/2006/relationships" xmlns:m="http://schemas.openxmlformats.org/officeDocument/2006/math" xmlns:w="http://schemas.openxmlformats.org/wordprocessingml/2006/main" xmlns:xml="http://www.w3.org/XML/1998/namespace" xmlns:wp="http://schemas.openxmlformats.org/drawingml/2006/wordprocessingDrawing" xmlns:a14="http://schemas.microsoft.com/office/drawing/2010/main" xmlns:p14="http://schemas.microsoft.com/office/powerpoint/2010/main" xmlns:p15="http://schemas.microsoft.com/office/powerpoint/2012/main" xmlns:p159="http://schemas.microsoft.com/office/powerpoint/2015/09/main" xmlns:p="http://schemas.openxmlformats.org/presentationml/2006/main">
+  <p:cSld name="">
     <p:spTree>
       <p:nvGrpSpPr>
         <p:cNvPr id="1" name=""/>
@@ -3478,8 +3787,6 @@
         <a:xfrm>
           <a:off x="0" y="0"/>
           <a:ext cx="0" cy="0"/>
-          <a:chOff x="0" y="0"/>
-          <a:chExt cx="0" cy="0"/>
         </a:xfrm>
       </p:grpSpPr>
       <p:sp>
@@ -3499,7 +3806,7 @@
           <a:p>
             <a:r>
               <a:rPr lang="en-US" smtClean="0"/>
-              <a:t>Click to edit Master title style</a:t>
+              <a:t>Click... text has been truncated due to evaluation version limitation.</a:t>
             </a:r>
             <a:endParaRPr lang="en-US"/>
           </a:p>
@@ -3522,7 +3829,78 @@
           <a:p>
             <a:r>
               <a:rPr lang="en-US" smtClean="0"/>
-              <a:t>Click to edit Master text styles</a:t>
+              <a:t>Click... text has been truncated due to evaluation version limitation.</a:t>
+            </a:r>
+          </a:p>
+        </p:txBody>
+      </p:sp>
+      <p:sp>
+        <p:nvSpPr>
+          <p:cNvPr id="4" name="TextBox"/>
+          <p:cNvSpPr txBox="1">
+            <a:spLocks noGrp="1" noSelect="1" noRot="1" noMove="1"/>
+          </p:cNvSpPr>
+          <p:nvPr/>
+        </p:nvSpPr>
+        <p:spPr>
+          <a:xfrm>
+            <a:off x="1366520" y="2644140"/>
+            <a:ext cx="6411372" cy="1569660"/>
+          </a:xfrm>
+          <a:prstGeom prst="rect">
+            <a:avLst/>
+          </a:prstGeom>
+          <a:noFill/>
+        </p:spPr>
+        <p:txBody>
+          <a:bodyPr wrap="none" rtlCol="0" anchor="ctr" anchorCtr="1">
+            <a:spAutoFit/>
+          </a:bodyPr>
+          <a:lstStyle>
+            <a:lvl1pPr algn="l">
+              <a:lnSpc>
+                <a:spcPct val="150000"/>
+              </a:lnSpc>
+              <a:spcBef>
+                <a:spcPct val="0"/>
+              </a:spcBef>
+              <a:spcAft>
+                <a:spcPct val="0"/>
+              </a:spcAft>
+              <a:defRPr lang="en-US" sz="3200" b="1" noProof="1" dirty="0">
+                <a:solidFill>
+                  <a:prstClr val="red">
+                    <a:lumOff val="30000"/>
+                    <a:alpha val="40000"/>
+                  </a:prstClr>
+                </a:solidFill>
+                <a:effectLst>
+                  <a:outerShdw blurRad="50800" dist="38100" algn="tr" rotWithShape="0">
+                    <a:prstClr val="black">
+                      <a:alpha val="80000"/>
+                    </a:prstClr>
+                  </a:outerShdw>
+                </a:effectLst>
+                <a:latin typeface="Calibri" pitchFamily="34" charset="0"/>
+              </a:defRPr>
+            </a:lvl1pPr>
+          </a:lstStyle>
+          <a:p>
+            <a:pPr algn="ctr"/>
+            <a:r>
+              <a:t>Evaluation only.</a:t>
+            </a:r>
+          </a:p>
+          <a:p>
+            <a:pPr algn="ctr"/>
+            <a:r>
+              <a:t>Created with Aspose.Slides for C++ 20.3.</a:t>
+            </a:r>
+          </a:p>
+          <a:p>
+            <a:pPr algn="ctr"/>
+            <a:r>
+              <a:t>Copyright 2004-2020Aspose Pty Ltd.</a:t>
             </a:r>
           </a:p>
         </p:txBody>
@@ -3533,12 +3911,13 @@
     <a:masterClrMapping/>
   </p:clrMapOvr>
   <p:transition/>
+  <p:timing/>
 </p:sld>
 </file>
 
 <file path=ppt/slides/slide4.xml><?xml version="1.0" encoding="utf-8"?>
-<p:sld xmlns:a="http://schemas.openxmlformats.org/drawingml/2006/main" xmlns:r="http://schemas.openxmlformats.org/officeDocument/2006/relationships" xmlns:p="http://schemas.openxmlformats.org/presentationml/2006/main">
-  <p:cSld>
+<p:sld xmlns:a="http://schemas.openxmlformats.org/drawingml/2006/main" xmlns:r="http://schemas.openxmlformats.org/officeDocument/2006/relationships" xmlns:m="http://schemas.openxmlformats.org/officeDocument/2006/math" xmlns:w="http://schemas.openxmlformats.org/wordprocessingml/2006/main" xmlns:xml="http://www.w3.org/XML/1998/namespace" xmlns:wp="http://schemas.openxmlformats.org/drawingml/2006/wordprocessingDrawing" xmlns:a14="http://schemas.microsoft.com/office/drawing/2010/main" xmlns:p14="http://schemas.microsoft.com/office/powerpoint/2010/main" xmlns:p15="http://schemas.microsoft.com/office/powerpoint/2012/main" xmlns:p159="http://schemas.microsoft.com/office/powerpoint/2015/09/main" xmlns:p="http://schemas.openxmlformats.org/presentationml/2006/main">
+  <p:cSld name="">
     <p:spTree>
       <p:nvGrpSpPr>
         <p:cNvPr id="1" name=""/>
@@ -3549,8 +3928,6 @@
         <a:xfrm>
           <a:off x="0" y="0"/>
           <a:ext cx="0" cy="0"/>
-          <a:chOff x="0" y="0"/>
-          <a:chExt cx="0" cy="0"/>
         </a:xfrm>
       </p:grpSpPr>
       <p:sp>
@@ -3574,7 +3951,7 @@
           <a:p>
             <a:r>
               <a:rPr lang="en-US" smtClean="0"/>
-              <a:t>Click to edit Master title style</a:t>
+              <a:t>Click... text has been truncated due to evaluation version limitation.</a:t>
             </a:r>
             <a:endParaRPr lang="en-US"/>
           </a:p>
@@ -3688,7 +4065,78 @@
           <a:p>
             <a:r>
               <a:rPr lang="en-US" smtClean="0"/>
-              <a:t>Click to edit Master text styles</a:t>
+              <a:t>Click... text has been truncated due to evaluation version limitation.</a:t>
+            </a:r>
+          </a:p>
+        </p:txBody>
+      </p:sp>
+      <p:sp>
+        <p:nvSpPr>
+          <p:cNvPr id="4" name="TextBox"/>
+          <p:cNvSpPr txBox="1">
+            <a:spLocks noGrp="1" noSelect="1" noRot="1" noMove="1"/>
+          </p:cNvSpPr>
+          <p:nvPr/>
+        </p:nvSpPr>
+        <p:spPr>
+          <a:xfrm>
+            <a:off x="1366520" y="2644140"/>
+            <a:ext cx="6411372" cy="1569660"/>
+          </a:xfrm>
+          <a:prstGeom prst="rect">
+            <a:avLst/>
+          </a:prstGeom>
+          <a:noFill/>
+        </p:spPr>
+        <p:txBody>
+          <a:bodyPr wrap="none" rtlCol="0" anchor="ctr" anchorCtr="1">
+            <a:spAutoFit/>
+          </a:bodyPr>
+          <a:lstStyle>
+            <a:lvl1pPr algn="l">
+              <a:lnSpc>
+                <a:spcPct val="150000"/>
+              </a:lnSpc>
+              <a:spcBef>
+                <a:spcPct val="0"/>
+              </a:spcBef>
+              <a:spcAft>
+                <a:spcPct val="0"/>
+              </a:spcAft>
+              <a:defRPr lang="en-US" sz="3200" b="1" noProof="1" dirty="0">
+                <a:solidFill>
+                  <a:prstClr val="red">
+                    <a:lumOff val="30000"/>
+                    <a:alpha val="40000"/>
+                  </a:prstClr>
+                </a:solidFill>
+                <a:effectLst>
+                  <a:outerShdw blurRad="50800" dist="38100" algn="tr" rotWithShape="0">
+                    <a:prstClr val="black">
+                      <a:alpha val="80000"/>
+                    </a:prstClr>
+                  </a:outerShdw>
+                </a:effectLst>
+                <a:latin typeface="Calibri" pitchFamily="34" charset="0"/>
+              </a:defRPr>
+            </a:lvl1pPr>
+          </a:lstStyle>
+          <a:p>
+            <a:pPr algn="ctr"/>
+            <a:r>
+              <a:t>Evaluation only.</a:t>
+            </a:r>
+          </a:p>
+          <a:p>
+            <a:pPr algn="ctr"/>
+            <a:r>
+              <a:t>Created with Aspose.Slides for C++ 20.3.</a:t>
+            </a:r>
+          </a:p>
+          <a:p>
+            <a:pPr algn="ctr"/>
+            <a:r>
+              <a:t>Copyright 2004-2020Aspose Pty Ltd.</a:t>
             </a:r>
           </a:p>
         </p:txBody>
@@ -3699,12 +4147,13 @@
     <a:masterClrMapping/>
   </p:clrMapOvr>
   <p:transition/>
+  <p:timing/>
 </p:sld>
 </file>
 
 <file path=ppt/slides/slide5.xml><?xml version="1.0" encoding="utf-8"?>
-<p:sld xmlns:a="http://schemas.openxmlformats.org/drawingml/2006/main" xmlns:r="http://schemas.openxmlformats.org/officeDocument/2006/relationships" xmlns:p="http://schemas.openxmlformats.org/presentationml/2006/main">
-  <p:cSld>
+<p:sld xmlns:a="http://schemas.openxmlformats.org/drawingml/2006/main" xmlns:r="http://schemas.openxmlformats.org/officeDocument/2006/relationships" xmlns:m="http://schemas.openxmlformats.org/officeDocument/2006/math" xmlns:w="http://schemas.openxmlformats.org/wordprocessingml/2006/main" xmlns:xml="http://www.w3.org/XML/1998/namespace" xmlns:wp="http://schemas.openxmlformats.org/drawingml/2006/wordprocessingDrawing" xmlns:a14="http://schemas.microsoft.com/office/drawing/2010/main" xmlns:p14="http://schemas.microsoft.com/office/powerpoint/2010/main" xmlns:p15="http://schemas.microsoft.com/office/powerpoint/2012/main" xmlns:p159="http://schemas.microsoft.com/office/powerpoint/2015/09/main" xmlns:p="http://schemas.openxmlformats.org/presentationml/2006/main">
+  <p:cSld name="">
     <p:spTree>
       <p:nvGrpSpPr>
         <p:cNvPr id="1" name=""/>
@@ -3715,8 +4164,6 @@
         <a:xfrm>
           <a:off x="0" y="0"/>
           <a:ext cx="0" cy="0"/>
-          <a:chOff x="0" y="0"/>
-          <a:chExt cx="0" cy="0"/>
         </a:xfrm>
       </p:grpSpPr>
       <p:sp>
@@ -3736,7 +4183,7 @@
           <a:p>
             <a:r>
               <a:rPr lang="en-US" smtClean="0"/>
-              <a:t>Click to edit Master title style</a:t>
+              <a:t>Click... text has been truncated due to evaluation version limitation.</a:t>
             </a:r>
             <a:endParaRPr lang="en-US"/>
           </a:p>
@@ -3787,7 +4234,7 @@
           <a:p>
             <a:r>
               <a:rPr lang="en-US" smtClean="0"/>
-              <a:t>Click to edit Master text styles</a:t>
+              <a:t>Click... text has been truncated due to evaluation version limitation.</a:t>
             </a:r>
           </a:p>
         </p:txBody>
@@ -3837,7 +4284,78 @@
           <a:p>
             <a:r>
               <a:rPr lang="en-US" smtClean="0"/>
-              <a:t>Click to edit Master text styles</a:t>
+              <a:t>Click... text has been truncated due to evaluation version limitation.</a:t>
+            </a:r>
+          </a:p>
+        </p:txBody>
+      </p:sp>
+      <p:sp>
+        <p:nvSpPr>
+          <p:cNvPr id="5" name="TextBox"/>
+          <p:cNvSpPr txBox="1">
+            <a:spLocks noGrp="1" noSelect="1" noRot="1" noMove="1"/>
+          </p:cNvSpPr>
+          <p:nvPr/>
+        </p:nvSpPr>
+        <p:spPr>
+          <a:xfrm>
+            <a:off x="1366520" y="2644140"/>
+            <a:ext cx="6411372" cy="1569660"/>
+          </a:xfrm>
+          <a:prstGeom prst="rect">
+            <a:avLst/>
+          </a:prstGeom>
+          <a:noFill/>
+        </p:spPr>
+        <p:txBody>
+          <a:bodyPr wrap="none" rtlCol="0" anchor="ctr" anchorCtr="1">
+            <a:spAutoFit/>
+          </a:bodyPr>
+          <a:lstStyle>
+            <a:lvl1pPr algn="l">
+              <a:lnSpc>
+                <a:spcPct val="150000"/>
+              </a:lnSpc>
+              <a:spcBef>
+                <a:spcPct val="0"/>
+              </a:spcBef>
+              <a:spcAft>
+                <a:spcPct val="0"/>
+              </a:spcAft>
+              <a:defRPr lang="en-US" sz="3200" b="1" noProof="1" dirty="0">
+                <a:solidFill>
+                  <a:prstClr val="red">
+                    <a:lumOff val="30000"/>
+                    <a:alpha val="40000"/>
+                  </a:prstClr>
+                </a:solidFill>
+                <a:effectLst>
+                  <a:outerShdw blurRad="50800" dist="38100" algn="tr" rotWithShape="0">
+                    <a:prstClr val="black">
+                      <a:alpha val="80000"/>
+                    </a:prstClr>
+                  </a:outerShdw>
+                </a:effectLst>
+                <a:latin typeface="Calibri" pitchFamily="34" charset="0"/>
+              </a:defRPr>
+            </a:lvl1pPr>
+          </a:lstStyle>
+          <a:p>
+            <a:pPr algn="ctr"/>
+            <a:r>
+              <a:t>Evaluation only.</a:t>
+            </a:r>
+          </a:p>
+          <a:p>
+            <a:pPr algn="ctr"/>
+            <a:r>
+              <a:t>Created with Aspose.Slides for C++ 20.3.</a:t>
+            </a:r>
+          </a:p>
+          <a:p>
+            <a:pPr algn="ctr"/>
+            <a:r>
+              <a:t>Copyright 2004-2020Aspose Pty Ltd.</a:t>
             </a:r>
           </a:p>
         </p:txBody>
@@ -3848,12 +4366,13 @@
     <a:masterClrMapping/>
   </p:clrMapOvr>
   <p:transition/>
+  <p:timing/>
 </p:sld>
 </file>
 
 <file path=ppt/slides/slide6.xml><?xml version="1.0" encoding="utf-8"?>
-<p:sld xmlns:a="http://schemas.openxmlformats.org/drawingml/2006/main" xmlns:r="http://schemas.openxmlformats.org/officeDocument/2006/relationships" xmlns:p="http://schemas.openxmlformats.org/presentationml/2006/main">
-  <p:cSld>
+<p:sld xmlns:a="http://schemas.openxmlformats.org/drawingml/2006/main" xmlns:r="http://schemas.openxmlformats.org/officeDocument/2006/relationships" xmlns:m="http://schemas.openxmlformats.org/officeDocument/2006/math" xmlns:w="http://schemas.openxmlformats.org/wordprocessingml/2006/main" xmlns:xml="http://www.w3.org/XML/1998/namespace" xmlns:wp="http://schemas.openxmlformats.org/drawingml/2006/wordprocessingDrawing" xmlns:a14="http://schemas.microsoft.com/office/drawing/2010/main" xmlns:p14="http://schemas.microsoft.com/office/powerpoint/2010/main" xmlns:p15="http://schemas.microsoft.com/office/powerpoint/2012/main" xmlns:p159="http://schemas.microsoft.com/office/powerpoint/2015/09/main" xmlns:p="http://schemas.openxmlformats.org/presentationml/2006/main">
+  <p:cSld name="">
     <p:spTree>
       <p:nvGrpSpPr>
         <p:cNvPr id="1" name=""/>
@@ -3864,8 +4383,6 @@
         <a:xfrm>
           <a:off x="0" y="0"/>
           <a:ext cx="0" cy="0"/>
-          <a:chOff x="0" y="0"/>
-          <a:chExt cx="0" cy="0"/>
         </a:xfrm>
       </p:grpSpPr>
       <p:sp>
@@ -3885,7 +4402,7 @@
           <a:p>
             <a:r>
               <a:rPr lang="en-US" smtClean="0"/>
-              <a:t>Click to edit Master title style</a:t>
+              <a:t>Click... text has been truncated due to evaluation version limitation.</a:t>
             </a:r>
             <a:endParaRPr lang="en-US"/>
           </a:p>
@@ -3945,7 +4462,7 @@
           <a:p>
             <a:r>
               <a:rPr lang="en-US" smtClean="0"/>
-              <a:t>Click to edit Master text styles</a:t>
+              <a:t>Click... text has been truncated due to evaluation version limitation.</a:t>
             </a:r>
           </a:p>
         </p:txBody>
@@ -3995,7 +4512,7 @@
           <a:p>
             <a:r>
               <a:rPr lang="en-US" smtClean="0"/>
-              <a:t>Click to edit Master text styles</a:t>
+              <a:t>Click... text has been truncated due to evaluation version limitation.</a:t>
             </a:r>
           </a:p>
         </p:txBody>
@@ -4054,7 +4571,7 @@
           <a:p>
             <a:r>
               <a:rPr lang="en-US" smtClean="0"/>
-              <a:t>Click to edit Master text styles</a:t>
+              <a:t>Click... text has been truncated due to evaluation version limitation.</a:t>
             </a:r>
           </a:p>
         </p:txBody>
@@ -4104,7 +4621,78 @@
           <a:p>
             <a:r>
               <a:rPr lang="en-US" smtClean="0"/>
-              <a:t>Click to edit Master text styles</a:t>
+              <a:t>Click... text has been truncated due to evaluation version limitation.</a:t>
+            </a:r>
+          </a:p>
+        </p:txBody>
+      </p:sp>
+      <p:sp>
+        <p:nvSpPr>
+          <p:cNvPr id="7" name="TextBox"/>
+          <p:cNvSpPr txBox="1">
+            <a:spLocks noGrp="1" noSelect="1" noRot="1" noMove="1"/>
+          </p:cNvSpPr>
+          <p:nvPr/>
+        </p:nvSpPr>
+        <p:spPr>
+          <a:xfrm>
+            <a:off x="1366520" y="2644140"/>
+            <a:ext cx="6411372" cy="1569660"/>
+          </a:xfrm>
+          <a:prstGeom prst="rect">
+            <a:avLst/>
+          </a:prstGeom>
+          <a:noFill/>
+        </p:spPr>
+        <p:txBody>
+          <a:bodyPr wrap="none" rtlCol="0" anchor="ctr" anchorCtr="1">
+            <a:spAutoFit/>
+          </a:bodyPr>
+          <a:lstStyle>
+            <a:lvl1pPr algn="l">
+              <a:lnSpc>
+                <a:spcPct val="150000"/>
+              </a:lnSpc>
+              <a:spcBef>
+                <a:spcPct val="0"/>
+              </a:spcBef>
+              <a:spcAft>
+                <a:spcPct val="0"/>
+              </a:spcAft>
+              <a:defRPr lang="en-US" sz="3200" b="1" noProof="1" dirty="0">
+                <a:solidFill>
+                  <a:prstClr val="red">
+                    <a:lumOff val="30000"/>
+                    <a:alpha val="40000"/>
+                  </a:prstClr>
+                </a:solidFill>
+                <a:effectLst>
+                  <a:outerShdw blurRad="50800" dist="38100" algn="tr" rotWithShape="0">
+                    <a:prstClr val="black">
+                      <a:alpha val="80000"/>
+                    </a:prstClr>
+                  </a:outerShdw>
+                </a:effectLst>
+                <a:latin typeface="Calibri" pitchFamily="34" charset="0"/>
+              </a:defRPr>
+            </a:lvl1pPr>
+          </a:lstStyle>
+          <a:p>
+            <a:pPr algn="ctr"/>
+            <a:r>
+              <a:t>Evaluation only.</a:t>
+            </a:r>
+          </a:p>
+          <a:p>
+            <a:pPr algn="ctr"/>
+            <a:r>
+              <a:t>Created with Aspose.Slides for C++ 20.3.</a:t>
+            </a:r>
+          </a:p>
+          <a:p>
+            <a:pPr algn="ctr"/>
+            <a:r>
+              <a:t>Copyright 2004-2020Aspose Pty Ltd.</a:t>
             </a:r>
           </a:p>
         </p:txBody>
@@ -4115,12 +4703,13 @@
     <a:masterClrMapping/>
   </p:clrMapOvr>
   <p:transition/>
+  <p:timing/>
 </p:sld>
 </file>
 
 <file path=ppt/slides/slide7.xml><?xml version="1.0" encoding="utf-8"?>
-<p:sld xmlns:a="http://schemas.openxmlformats.org/drawingml/2006/main" xmlns:r="http://schemas.openxmlformats.org/officeDocument/2006/relationships" xmlns:p="http://schemas.openxmlformats.org/presentationml/2006/main">
-  <p:cSld>
+<p:sld xmlns:a="http://schemas.openxmlformats.org/drawingml/2006/main" xmlns:r="http://schemas.openxmlformats.org/officeDocument/2006/relationships" xmlns:m="http://schemas.openxmlformats.org/officeDocument/2006/math" xmlns:w="http://schemas.openxmlformats.org/wordprocessingml/2006/main" xmlns:xml="http://www.w3.org/XML/1998/namespace" xmlns:wp="http://schemas.openxmlformats.org/drawingml/2006/wordprocessingDrawing" xmlns:a14="http://schemas.microsoft.com/office/drawing/2010/main" xmlns:p14="http://schemas.microsoft.com/office/powerpoint/2010/main" xmlns:p15="http://schemas.microsoft.com/office/powerpoint/2012/main" xmlns:p159="http://schemas.microsoft.com/office/powerpoint/2015/09/main" xmlns:p="http://schemas.openxmlformats.org/presentationml/2006/main">
+  <p:cSld name="">
     <p:spTree>
       <p:nvGrpSpPr>
         <p:cNvPr id="1" name=""/>
@@ -4131,8 +4720,6 @@
         <a:xfrm>
           <a:off x="0" y="0"/>
           <a:ext cx="0" cy="0"/>
-          <a:chOff x="0" y="0"/>
-          <a:chExt cx="0" cy="0"/>
         </a:xfrm>
       </p:grpSpPr>
       <p:sp>
@@ -4152,9 +4739,80 @@
           <a:p>
             <a:r>
               <a:rPr lang="en-US" smtClean="0"/>
-              <a:t>Click to edit Master title style</a:t>
-            </a:r>
-            <a:endParaRPr lang="en-US"/>
+              <a:t>Click... text has been truncated due to evaluation version limitation.</a:t>
+            </a:r>
+            <a:endParaRPr lang="en-US"/>
+          </a:p>
+        </p:txBody>
+      </p:sp>
+      <p:sp>
+        <p:nvSpPr>
+          <p:cNvPr id="3" name="TextBox"/>
+          <p:cNvSpPr txBox="1">
+            <a:spLocks noGrp="1" noSelect="1" noRot="1" noMove="1"/>
+          </p:cNvSpPr>
+          <p:nvPr/>
+        </p:nvSpPr>
+        <p:spPr>
+          <a:xfrm>
+            <a:off x="1366520" y="2644140"/>
+            <a:ext cx="6411372" cy="1569660"/>
+          </a:xfrm>
+          <a:prstGeom prst="rect">
+            <a:avLst/>
+          </a:prstGeom>
+          <a:noFill/>
+        </p:spPr>
+        <p:txBody>
+          <a:bodyPr wrap="none" rtlCol="0" anchor="ctr" anchorCtr="1">
+            <a:spAutoFit/>
+          </a:bodyPr>
+          <a:lstStyle>
+            <a:lvl1pPr algn="l">
+              <a:lnSpc>
+                <a:spcPct val="150000"/>
+              </a:lnSpc>
+              <a:spcBef>
+                <a:spcPct val="0"/>
+              </a:spcBef>
+              <a:spcAft>
+                <a:spcPct val="0"/>
+              </a:spcAft>
+              <a:defRPr lang="en-US" sz="3200" b="1" noProof="1" dirty="0">
+                <a:solidFill>
+                  <a:prstClr val="red">
+                    <a:lumOff val="30000"/>
+                    <a:alpha val="40000"/>
+                  </a:prstClr>
+                </a:solidFill>
+                <a:effectLst>
+                  <a:outerShdw blurRad="50800" dist="38100" algn="tr" rotWithShape="0">
+                    <a:prstClr val="black">
+                      <a:alpha val="80000"/>
+                    </a:prstClr>
+                  </a:outerShdw>
+                </a:effectLst>
+                <a:latin typeface="Calibri" pitchFamily="34" charset="0"/>
+              </a:defRPr>
+            </a:lvl1pPr>
+          </a:lstStyle>
+          <a:p>
+            <a:pPr algn="ctr"/>
+            <a:r>
+              <a:t>Evaluation only.</a:t>
+            </a:r>
+          </a:p>
+          <a:p>
+            <a:pPr algn="ctr"/>
+            <a:r>
+              <a:t>Created with Aspose.Slides for C++ 20.3.</a:t>
+            </a:r>
+          </a:p>
+          <a:p>
+            <a:pPr algn="ctr"/>
+            <a:r>
+              <a:t>Copyright 2004-2020Aspose Pty Ltd.</a:t>
+            </a:r>
           </a:p>
         </p:txBody>
       </p:sp>
@@ -4164,12 +4822,13 @@
     <a:masterClrMapping/>
   </p:clrMapOvr>
   <p:transition/>
+  <p:timing/>
 </p:sld>
 </file>
 
 <file path=ppt/slides/slide8.xml><?xml version="1.0" encoding="utf-8"?>
-<p:sld xmlns:a="http://schemas.openxmlformats.org/drawingml/2006/main" xmlns:r="http://schemas.openxmlformats.org/officeDocument/2006/relationships" xmlns:p="http://schemas.openxmlformats.org/presentationml/2006/main">
-  <p:cSld>
+<p:sld xmlns:a="http://schemas.openxmlformats.org/drawingml/2006/main" xmlns:r="http://schemas.openxmlformats.org/officeDocument/2006/relationships" xmlns:m="http://schemas.openxmlformats.org/officeDocument/2006/math" xmlns:w="http://schemas.openxmlformats.org/wordprocessingml/2006/main" xmlns:xml="http://www.w3.org/XML/1998/namespace" xmlns:wp="http://schemas.openxmlformats.org/drawingml/2006/wordprocessingDrawing" xmlns:a14="http://schemas.microsoft.com/office/drawing/2010/main" xmlns:p14="http://schemas.microsoft.com/office/powerpoint/2010/main" xmlns:p15="http://schemas.microsoft.com/office/powerpoint/2012/main" xmlns:p159="http://schemas.microsoft.com/office/powerpoint/2015/09/main" xmlns:p="http://schemas.openxmlformats.org/presentationml/2006/main">
+  <p:cSld name="">
     <p:spTree>
       <p:nvGrpSpPr>
         <p:cNvPr id="1" name=""/>
@@ -4180,22 +4839,92 @@
         <a:xfrm>
           <a:off x="0" y="0"/>
           <a:ext cx="0" cy="0"/>
-          <a:chOff x="0" y="0"/>
-          <a:chExt cx="0" cy="0"/>
         </a:xfrm>
       </p:grpSpPr>
+      <p:sp>
+        <p:nvSpPr>
+          <p:cNvPr id="1" name="TextBox"/>
+          <p:cNvSpPr txBox="1">
+            <a:spLocks noGrp="1" noSelect="1" noRot="1" noMove="1"/>
+          </p:cNvSpPr>
+          <p:nvPr/>
+        </p:nvSpPr>
+        <p:spPr>
+          <a:xfrm>
+            <a:off x="1366520" y="2644140"/>
+            <a:ext cx="6411372" cy="1569660"/>
+          </a:xfrm>
+          <a:prstGeom prst="rect">
+            <a:avLst/>
+          </a:prstGeom>
+          <a:noFill/>
+        </p:spPr>
+        <p:txBody>
+          <a:bodyPr wrap="none" rtlCol="0" anchor="ctr" anchorCtr="1">
+            <a:spAutoFit/>
+          </a:bodyPr>
+          <a:lstStyle>
+            <a:lvl1pPr algn="l">
+              <a:lnSpc>
+                <a:spcPct val="150000"/>
+              </a:lnSpc>
+              <a:spcBef>
+                <a:spcPct val="0"/>
+              </a:spcBef>
+              <a:spcAft>
+                <a:spcPct val="0"/>
+              </a:spcAft>
+              <a:defRPr lang="en-US" sz="3200" b="1" noProof="1" dirty="0">
+                <a:solidFill>
+                  <a:prstClr val="red">
+                    <a:lumOff val="30000"/>
+                    <a:alpha val="40000"/>
+                  </a:prstClr>
+                </a:solidFill>
+                <a:effectLst>
+                  <a:outerShdw blurRad="50800" dist="38100" algn="tr" rotWithShape="0">
+                    <a:prstClr val="black">
+                      <a:alpha val="80000"/>
+                    </a:prstClr>
+                  </a:outerShdw>
+                </a:effectLst>
+                <a:latin typeface="Calibri" pitchFamily="34" charset="0"/>
+              </a:defRPr>
+            </a:lvl1pPr>
+          </a:lstStyle>
+          <a:p>
+            <a:pPr algn="ctr"/>
+            <a:r>
+              <a:t>Evaluation only.</a:t>
+            </a:r>
+          </a:p>
+          <a:p>
+            <a:pPr algn="ctr"/>
+            <a:r>
+              <a:t>Created with Aspose.Slides for C++ 20.3.</a:t>
+            </a:r>
+          </a:p>
+          <a:p>
+            <a:pPr algn="ctr"/>
+            <a:r>
+              <a:t>Copyright 2004-2020Aspose Pty Ltd.</a:t>
+            </a:r>
+          </a:p>
+        </p:txBody>
+      </p:sp>
     </p:spTree>
   </p:cSld>
   <p:clrMapOvr>
     <a:masterClrMapping/>
   </p:clrMapOvr>
   <p:transition/>
+  <p:timing/>
 </p:sld>
 </file>
 
 <file path=ppt/slides/slide9.xml><?xml version="1.0" encoding="utf-8"?>
-<p:sld xmlns:a="http://schemas.openxmlformats.org/drawingml/2006/main" xmlns:r="http://schemas.openxmlformats.org/officeDocument/2006/relationships" xmlns:p="http://schemas.openxmlformats.org/presentationml/2006/main">
-  <p:cSld>
+<p:sld xmlns:a="http://schemas.openxmlformats.org/drawingml/2006/main" xmlns:r="http://schemas.openxmlformats.org/officeDocument/2006/relationships" xmlns:m="http://schemas.openxmlformats.org/officeDocument/2006/math" xmlns:w="http://schemas.openxmlformats.org/wordprocessingml/2006/main" xmlns:xml="http://www.w3.org/XML/1998/namespace" xmlns:wp="http://schemas.openxmlformats.org/drawingml/2006/wordprocessingDrawing" xmlns:a14="http://schemas.microsoft.com/office/drawing/2010/main" xmlns:p14="http://schemas.microsoft.com/office/powerpoint/2010/main" xmlns:p15="http://schemas.microsoft.com/office/powerpoint/2012/main" xmlns:p159="http://schemas.microsoft.com/office/powerpoint/2015/09/main" xmlns:p="http://schemas.openxmlformats.org/presentationml/2006/main">
+  <p:cSld name="">
     <p:spTree>
       <p:nvGrpSpPr>
         <p:cNvPr id="1" name=""/>
@@ -4206,8 +4935,6 @@
         <a:xfrm>
           <a:off x="0" y="0"/>
           <a:ext cx="0" cy="0"/>
-          <a:chOff x="0" y="0"/>
-          <a:chExt cx="0" cy="0"/>
         </a:xfrm>
       </p:grpSpPr>
       <p:sp>
@@ -4231,7 +4958,7 @@
           <a:p>
             <a:r>
               <a:rPr lang="en-US" smtClean="0"/>
-              <a:t>Click to edit Master title style</a:t>
+              <a:t>Click... text has been truncated due to evaluation version limitation.</a:t>
             </a:r>
             <a:endParaRPr lang="en-US"/>
           </a:p>
@@ -4282,7 +5009,7 @@
           <a:p>
             <a:r>
               <a:rPr lang="en-US" smtClean="0"/>
-              <a:t>Click to edit Master text styles</a:t>
+              <a:t>Click... text has been truncated due to evaluation version limitation.</a:t>
             </a:r>
           </a:p>
         </p:txBody>
@@ -4341,7 +5068,78 @@
           <a:p>
             <a:r>
               <a:rPr lang="en-US" smtClean="0"/>
-              <a:t>Click to edit Master text styles</a:t>
+              <a:t>Click... text has been truncated due to evaluation version limitation.</a:t>
+            </a:r>
+          </a:p>
+        </p:txBody>
+      </p:sp>
+      <p:sp>
+        <p:nvSpPr>
+          <p:cNvPr id="5" name="TextBox"/>
+          <p:cNvSpPr txBox="1">
+            <a:spLocks noGrp="1" noSelect="1" noRot="1" noMove="1"/>
+          </p:cNvSpPr>
+          <p:nvPr/>
+        </p:nvSpPr>
+        <p:spPr>
+          <a:xfrm>
+            <a:off x="1366520" y="2644140"/>
+            <a:ext cx="6411372" cy="1569660"/>
+          </a:xfrm>
+          <a:prstGeom prst="rect">
+            <a:avLst/>
+          </a:prstGeom>
+          <a:noFill/>
+        </p:spPr>
+        <p:txBody>
+          <a:bodyPr wrap="none" rtlCol="0" anchor="ctr" anchorCtr="1">
+            <a:spAutoFit/>
+          </a:bodyPr>
+          <a:lstStyle>
+            <a:lvl1pPr algn="l">
+              <a:lnSpc>
+                <a:spcPct val="150000"/>
+              </a:lnSpc>
+              <a:spcBef>
+                <a:spcPct val="0"/>
+              </a:spcBef>
+              <a:spcAft>
+                <a:spcPct val="0"/>
+              </a:spcAft>
+              <a:defRPr lang="en-US" sz="3200" b="1" noProof="1" dirty="0">
+                <a:solidFill>
+                  <a:prstClr val="red">
+                    <a:lumOff val="30000"/>
+                    <a:alpha val="40000"/>
+                  </a:prstClr>
+                </a:solidFill>
+                <a:effectLst>
+                  <a:outerShdw blurRad="50800" dist="38100" algn="tr" rotWithShape="0">
+                    <a:prstClr val="black">
+                      <a:alpha val="80000"/>
+                    </a:prstClr>
+                  </a:outerShdw>
+                </a:effectLst>
+                <a:latin typeface="Calibri" pitchFamily="34" charset="0"/>
+              </a:defRPr>
+            </a:lvl1pPr>
+          </a:lstStyle>
+          <a:p>
+            <a:pPr algn="ctr"/>
+            <a:r>
+              <a:t>Evaluation only.</a:t>
+            </a:r>
+          </a:p>
+          <a:p>
+            <a:pPr algn="ctr"/>
+            <a:r>
+              <a:t>Created with Aspose.Slides for C++ 20.3.</a:t>
+            </a:r>
+          </a:p>
+          <a:p>
+            <a:pPr algn="ctr"/>
+            <a:r>
+              <a:t>Copyright 2004-2020Aspose Pty Ltd.</a:t>
             </a:r>
           </a:p>
         </p:txBody>
@@ -4352,21 +5150,22 @@
     <a:masterClrMapping/>
   </p:clrMapOvr>
   <p:transition/>
+  <p:timing/>
 </p:sld>
 </file>
 
 <file path=ppt/tags/tag1.xml><?xml version="1.0" encoding="utf-8"?>
-<p:tagLst xmlns:a="http://schemas.openxmlformats.org/drawingml/2006/main" xmlns:r="http://schemas.openxmlformats.org/officeDocument/2006/relationships" xmlns:p="http://schemas.openxmlformats.org/presentationml/2006/main">
+<p:tagLst xmlns:p="http://schemas.openxmlformats.org/presentationml/2006/main">
   <p:tag name="AS_NET" val="2.0.50727.5448"/>
-  <p:tag name="AS_OS" val="Microsoft Windows NT 6.1.7601 Service Pack 1"/>
-  <p:tag name="AS_RELEASE_DATE" val="2017.12.11"/>
+  <p:tag name="AS_OS" val="Microsoft Windows NT 6.2.9200.0"/>
+  <p:tag name="AS_RELEASE_DATE" val="2020.03.25"/>
   <p:tag name="AS_TITLE" val="Aspose.Slides for C++"/>
-  <p:tag name="AS_VERSION" val="17.11"/>
+  <p:tag name="AS_VERSION" val="20.3"/>
 </p:tagLst>
 </file>
 
 <file path=ppt/theme/theme1.xml><?xml version="1.0" encoding="utf-8"?>
-<a:theme xmlns:a="http://schemas.openxmlformats.org/drawingml/2006/main" name="Office Theme">
+<a:theme xmlns:r="http://schemas.openxmlformats.org/officeDocument/2006/relationships" xmlns:a="http://schemas.openxmlformats.org/drawingml/2006/main" name="Office Theme">
   <a:themeElements>
     <a:clrScheme name="Office">
       <a:dk1>
@@ -4645,7 +5444,5 @@
       </a:bgFillStyleLst>
     </a:fmtScheme>
   </a:themeElements>
-  <a:objectDefaults/>
-  <a:extraClrSchemeLst/>
 </a:theme>
 </file>
</xml_diff>